<commit_message>
updated the presentation file
</commit_message>
<xml_diff>
--- a/python_project.pptx
+++ b/python_project.pptx
@@ -11431,7 +11431,7 @@
         <p:spPr>
           <a:xfrm>
             <a:off x="823850" y="4508370"/>
-            <a:ext cx="5450958" cy="507831"/>
+            <a:ext cx="5450958" cy="230832"/>
           </a:xfrm>
           <a:prstGeom prst="rect">
             <a:avLst/>
@@ -11452,7 +11452,7 @@
                   </a:schemeClr>
                 </a:solidFill>
               </a:rPr>
-              <a:t>NOTE: The source code for this game is available in main.py and a compiled version is given in main.exe. This will run on windows devices and comes with all modules pre-installed and can run without having python installed.</a:t>
+              <a:t>NOTE: The source code for this game is available in main.py.</a:t>
             </a:r>
             <a:endParaRPr lang="en-IN" sz="900" dirty="0">
               <a:solidFill>

</xml_diff>